<commit_message>
Clean up markdown files, keep only PowerPoint presentation
</commit_message>
<xml_diff>
--- a/Stock_Cards_Presentation.pptx
+++ b/Stock_Cards_Presentation.pptx
@@ -5,14 +5,14 @@
     <p:sldMasterId id="2147483648" r:id="rId1"/>
   </p:sldMasterIdLst>
   <p:sldIdLst>
-    <p:sldId id="256" r:id="rId7"/>
-    <p:sldId id="257" r:id="rId8"/>
-    <p:sldId id="258" r:id="rId9"/>
-    <p:sldId id="259" r:id="rId10"/>
-    <p:sldId id="260" r:id="rId11"/>
-    <p:sldId id="261" r:id="rId12"/>
+    <p:sldId id="256" r:id="rId2"/>
+    <p:sldId id="257" r:id="rId3"/>
+    <p:sldId id="258" r:id="rId4"/>
+    <p:sldId id="259" r:id="rId5"/>
+    <p:sldId id="260" r:id="rId6"/>
+    <p:sldId id="261" r:id="rId7"/>
   </p:sldIdLst>
-  <p:sldSz cx="14630400" cy="8229600" type="screen4x3"/>
+  <p:sldSz cx="14630400" cy="8229600"/>
   <p:notesSz cx="6858000" cy="9144000"/>
   <p:defaultTextStyle>
     <a:defPPr>
@@ -109,6 +109,22 @@
       </a:defRPr>
     </a:lvl9pPr>
   </p:defaultTextStyle>
+  <p:extLst>
+    <p:ext uri="{EFAFB233-063F-42B5-8137-9DF3F51BA10A}">
+      <p15:sldGuideLst xmlns:p15="http://schemas.microsoft.com/office/powerpoint/2012/main">
+        <p15:guide id="1" orient="horz" pos="2160">
+          <p15:clr>
+            <a:srgbClr val="A4A3A4"/>
+          </p15:clr>
+        </p15:guide>
+        <p15:guide id="2" pos="2880">
+          <p15:clr>
+            <a:srgbClr val="A4A3A4"/>
+          </p15:clr>
+        </p15:guide>
+      </p15:sldGuideLst>
+    </p:ext>
+  </p:extLst>
 </p:presentation>
 </file>
 
@@ -150,10 +166,9 @@
           <a:lstStyle/>
           <a:p>
             <a:r>
-              <a:rPr lang="en-US" smtClean="0"/>
+              <a:rPr lang="en-US"/>
               <a:t>Click to edit Master title style</a:t>
             </a:r>
-            <a:endParaRPr lang="en-US"/>
           </a:p>
         </p:txBody>
       </p:sp>
@@ -269,10 +284,9 @@
           </a:lstStyle>
           <a:p>
             <a:r>
-              <a:rPr lang="en-US" smtClean="0"/>
+              <a:rPr lang="en-US"/>
               <a:t>Click to edit Master subtitle style</a:t>
             </a:r>
-            <a:endParaRPr lang="en-US"/>
           </a:p>
         </p:txBody>
       </p:sp>
@@ -293,7 +307,7 @@
           <a:p>
             <a:fld id="{5BCAD085-E8A6-8845-BD4E-CB4CCA059FC4}" type="datetimeFigureOut">
               <a:rPr lang="en-US" smtClean="0"/>
-              <a:t>1/27/13</a:t>
+              <a:t>12/16/25</a:t>
             </a:fld>
             <a:endParaRPr lang="en-US"/>
           </a:p>
@@ -387,10 +401,9 @@
           <a:lstStyle/>
           <a:p>
             <a:r>
-              <a:rPr lang="en-US" smtClean="0"/>
+              <a:rPr lang="en-US"/>
               <a:t>Click to edit Master title style</a:t>
             </a:r>
-            <a:endParaRPr lang="en-US"/>
           </a:p>
         </p:txBody>
       </p:sp>
@@ -411,38 +424,37 @@
           <a:p>
             <a:pPr lvl="0"/>
             <a:r>
-              <a:rPr lang="en-US" smtClean="0"/>
+              <a:rPr lang="en-US"/>
               <a:t>Click to edit Master text styles</a:t>
             </a:r>
           </a:p>
           <a:p>
             <a:pPr lvl="1"/>
             <a:r>
-              <a:rPr lang="en-US" smtClean="0"/>
+              <a:rPr lang="en-US"/>
               <a:t>Second level</a:t>
             </a:r>
           </a:p>
           <a:p>
             <a:pPr lvl="2"/>
             <a:r>
-              <a:rPr lang="en-US" smtClean="0"/>
+              <a:rPr lang="en-US"/>
               <a:t>Third level</a:t>
             </a:r>
           </a:p>
           <a:p>
             <a:pPr lvl="3"/>
             <a:r>
-              <a:rPr lang="en-US" smtClean="0"/>
+              <a:rPr lang="en-US"/>
               <a:t>Fourth level</a:t>
             </a:r>
           </a:p>
           <a:p>
             <a:pPr lvl="4"/>
             <a:r>
-              <a:rPr lang="en-US" smtClean="0"/>
+              <a:rPr lang="en-US"/>
               <a:t>Fifth level</a:t>
             </a:r>
-            <a:endParaRPr lang="en-US"/>
           </a:p>
         </p:txBody>
       </p:sp>
@@ -463,7 +475,7 @@
           <a:p>
             <a:fld id="{5BCAD085-E8A6-8845-BD4E-CB4CCA059FC4}" type="datetimeFigureOut">
               <a:rPr lang="en-US" smtClean="0"/>
-              <a:t>1/27/13</a:t>
+              <a:t>12/16/25</a:t>
             </a:fld>
             <a:endParaRPr lang="en-US"/>
           </a:p>
@@ -562,10 +574,9 @@
           <a:lstStyle/>
           <a:p>
             <a:r>
-              <a:rPr lang="en-US" smtClean="0"/>
+              <a:rPr lang="en-US"/>
               <a:t>Click to edit Master title style</a:t>
             </a:r>
-            <a:endParaRPr lang="en-US"/>
           </a:p>
         </p:txBody>
       </p:sp>
@@ -591,38 +602,37 @@
           <a:p>
             <a:pPr lvl="0"/>
             <a:r>
-              <a:rPr lang="en-US" smtClean="0"/>
+              <a:rPr lang="en-US"/>
               <a:t>Click to edit Master text styles</a:t>
             </a:r>
           </a:p>
           <a:p>
             <a:pPr lvl="1"/>
             <a:r>
-              <a:rPr lang="en-US" smtClean="0"/>
+              <a:rPr lang="en-US"/>
               <a:t>Second level</a:t>
             </a:r>
           </a:p>
           <a:p>
             <a:pPr lvl="2"/>
             <a:r>
-              <a:rPr lang="en-US" smtClean="0"/>
+              <a:rPr lang="en-US"/>
               <a:t>Third level</a:t>
             </a:r>
           </a:p>
           <a:p>
             <a:pPr lvl="3"/>
             <a:r>
-              <a:rPr lang="en-US" smtClean="0"/>
+              <a:rPr lang="en-US"/>
               <a:t>Fourth level</a:t>
             </a:r>
           </a:p>
           <a:p>
             <a:pPr lvl="4"/>
             <a:r>
-              <a:rPr lang="en-US" smtClean="0"/>
+              <a:rPr lang="en-US"/>
               <a:t>Fifth level</a:t>
             </a:r>
-            <a:endParaRPr lang="en-US"/>
           </a:p>
         </p:txBody>
       </p:sp>
@@ -643,7 +653,7 @@
           <a:p>
             <a:fld id="{5BCAD085-E8A6-8845-BD4E-CB4CCA059FC4}" type="datetimeFigureOut">
               <a:rPr lang="en-US" smtClean="0"/>
-              <a:t>1/27/13</a:t>
+              <a:t>12/16/25</a:t>
             </a:fld>
             <a:endParaRPr lang="en-US"/>
           </a:p>
@@ -737,10 +747,9 @@
           <a:lstStyle/>
           <a:p>
             <a:r>
-              <a:rPr lang="en-US" smtClean="0"/>
+              <a:rPr lang="en-US"/>
               <a:t>Click to edit Master title style</a:t>
             </a:r>
-            <a:endParaRPr lang="en-US"/>
           </a:p>
         </p:txBody>
       </p:sp>
@@ -761,38 +770,37 @@
           <a:p>
             <a:pPr lvl="0"/>
             <a:r>
-              <a:rPr lang="en-US" smtClean="0"/>
+              <a:rPr lang="en-US"/>
               <a:t>Click to edit Master text styles</a:t>
             </a:r>
           </a:p>
           <a:p>
             <a:pPr lvl="1"/>
             <a:r>
-              <a:rPr lang="en-US" smtClean="0"/>
+              <a:rPr lang="en-US"/>
               <a:t>Second level</a:t>
             </a:r>
           </a:p>
           <a:p>
             <a:pPr lvl="2"/>
             <a:r>
-              <a:rPr lang="en-US" smtClean="0"/>
+              <a:rPr lang="en-US"/>
               <a:t>Third level</a:t>
             </a:r>
           </a:p>
           <a:p>
             <a:pPr lvl="3"/>
             <a:r>
-              <a:rPr lang="en-US" smtClean="0"/>
+              <a:rPr lang="en-US"/>
               <a:t>Fourth level</a:t>
             </a:r>
           </a:p>
           <a:p>
             <a:pPr lvl="4"/>
             <a:r>
-              <a:rPr lang="en-US" smtClean="0"/>
+              <a:rPr lang="en-US"/>
               <a:t>Fifth level</a:t>
             </a:r>
-            <a:endParaRPr lang="en-US"/>
           </a:p>
         </p:txBody>
       </p:sp>
@@ -813,7 +821,7 @@
           <a:p>
             <a:fld id="{5BCAD085-E8A6-8845-BD4E-CB4CCA059FC4}" type="datetimeFigureOut">
               <a:rPr lang="en-US" smtClean="0"/>
-              <a:t>1/27/13</a:t>
+              <a:t>12/16/25</a:t>
             </a:fld>
             <a:endParaRPr lang="en-US"/>
           </a:p>
@@ -916,10 +924,9 @@
           </a:lstStyle>
           <a:p>
             <a:r>
-              <a:rPr lang="en-US" smtClean="0"/>
+              <a:rPr lang="en-US"/>
               <a:t>Click to edit Master title style</a:t>
             </a:r>
-            <a:endParaRPr lang="en-US"/>
           </a:p>
         </p:txBody>
       </p:sp>
@@ -1036,7 +1043,7 @@
           <a:p>
             <a:pPr lvl="0"/>
             <a:r>
-              <a:rPr lang="en-US" smtClean="0"/>
+              <a:rPr lang="en-US"/>
               <a:t>Click to edit Master text styles</a:t>
             </a:r>
           </a:p>
@@ -1059,7 +1066,7 @@
           <a:p>
             <a:fld id="{5BCAD085-E8A6-8845-BD4E-CB4CCA059FC4}" type="datetimeFigureOut">
               <a:rPr lang="en-US" smtClean="0"/>
-              <a:t>1/27/13</a:t>
+              <a:t>12/16/25</a:t>
             </a:fld>
             <a:endParaRPr lang="en-US"/>
           </a:p>
@@ -1153,10 +1160,9 @@
           <a:lstStyle/>
           <a:p>
             <a:r>
-              <a:rPr lang="en-US" smtClean="0"/>
+              <a:rPr lang="en-US"/>
               <a:t>Click to edit Master title style</a:t>
             </a:r>
-            <a:endParaRPr lang="en-US"/>
           </a:p>
         </p:txBody>
       </p:sp>
@@ -1210,38 +1216,37 @@
           <a:p>
             <a:pPr lvl="0"/>
             <a:r>
-              <a:rPr lang="en-US" smtClean="0"/>
+              <a:rPr lang="en-US"/>
               <a:t>Click to edit Master text styles</a:t>
             </a:r>
           </a:p>
           <a:p>
             <a:pPr lvl="1"/>
             <a:r>
-              <a:rPr lang="en-US" smtClean="0"/>
+              <a:rPr lang="en-US"/>
               <a:t>Second level</a:t>
             </a:r>
           </a:p>
           <a:p>
             <a:pPr lvl="2"/>
             <a:r>
-              <a:rPr lang="en-US" smtClean="0"/>
+              <a:rPr lang="en-US"/>
               <a:t>Third level</a:t>
             </a:r>
           </a:p>
           <a:p>
             <a:pPr lvl="3"/>
             <a:r>
-              <a:rPr lang="en-US" smtClean="0"/>
+              <a:rPr lang="en-US"/>
               <a:t>Fourth level</a:t>
             </a:r>
           </a:p>
           <a:p>
             <a:pPr lvl="4"/>
             <a:r>
-              <a:rPr lang="en-US" smtClean="0"/>
+              <a:rPr lang="en-US"/>
               <a:t>Fifth level</a:t>
             </a:r>
-            <a:endParaRPr lang="en-US"/>
           </a:p>
         </p:txBody>
       </p:sp>
@@ -1295,38 +1300,37 @@
           <a:p>
             <a:pPr lvl="0"/>
             <a:r>
-              <a:rPr lang="en-US" smtClean="0"/>
+              <a:rPr lang="en-US"/>
               <a:t>Click to edit Master text styles</a:t>
             </a:r>
           </a:p>
           <a:p>
             <a:pPr lvl="1"/>
             <a:r>
-              <a:rPr lang="en-US" smtClean="0"/>
+              <a:rPr lang="en-US"/>
               <a:t>Second level</a:t>
             </a:r>
           </a:p>
           <a:p>
             <a:pPr lvl="2"/>
             <a:r>
-              <a:rPr lang="en-US" smtClean="0"/>
+              <a:rPr lang="en-US"/>
               <a:t>Third level</a:t>
             </a:r>
           </a:p>
           <a:p>
             <a:pPr lvl="3"/>
             <a:r>
-              <a:rPr lang="en-US" smtClean="0"/>
+              <a:rPr lang="en-US"/>
               <a:t>Fourth level</a:t>
             </a:r>
           </a:p>
           <a:p>
             <a:pPr lvl="4"/>
             <a:r>
-              <a:rPr lang="en-US" smtClean="0"/>
+              <a:rPr lang="en-US"/>
               <a:t>Fifth level</a:t>
             </a:r>
-            <a:endParaRPr lang="en-US"/>
           </a:p>
         </p:txBody>
       </p:sp>
@@ -1347,7 +1351,7 @@
           <a:p>
             <a:fld id="{5BCAD085-E8A6-8845-BD4E-CB4CCA059FC4}" type="datetimeFigureOut">
               <a:rPr lang="en-US" smtClean="0"/>
-              <a:t>1/27/13</a:t>
+              <a:t>12/16/25</a:t>
             </a:fld>
             <a:endParaRPr lang="en-US"/>
           </a:p>
@@ -1445,10 +1449,9 @@
           </a:lstStyle>
           <a:p>
             <a:r>
-              <a:rPr lang="en-US" smtClean="0"/>
+              <a:rPr lang="en-US"/>
               <a:t>Click to edit Master title style</a:t>
             </a:r>
-            <a:endParaRPr lang="en-US"/>
           </a:p>
         </p:txBody>
       </p:sp>
@@ -1511,7 +1514,7 @@
           <a:p>
             <a:pPr lvl="0"/>
             <a:r>
-              <a:rPr lang="en-US" smtClean="0"/>
+              <a:rPr lang="en-US"/>
               <a:t>Click to edit Master text styles</a:t>
             </a:r>
           </a:p>
@@ -1567,38 +1570,37 @@
           <a:p>
             <a:pPr lvl="0"/>
             <a:r>
-              <a:rPr lang="en-US" smtClean="0"/>
+              <a:rPr lang="en-US"/>
               <a:t>Click to edit Master text styles</a:t>
             </a:r>
           </a:p>
           <a:p>
             <a:pPr lvl="1"/>
             <a:r>
-              <a:rPr lang="en-US" smtClean="0"/>
+              <a:rPr lang="en-US"/>
               <a:t>Second level</a:t>
             </a:r>
           </a:p>
           <a:p>
             <a:pPr lvl="2"/>
             <a:r>
-              <a:rPr lang="en-US" smtClean="0"/>
+              <a:rPr lang="en-US"/>
               <a:t>Third level</a:t>
             </a:r>
           </a:p>
           <a:p>
             <a:pPr lvl="3"/>
             <a:r>
-              <a:rPr lang="en-US" smtClean="0"/>
+              <a:rPr lang="en-US"/>
               <a:t>Fourth level</a:t>
             </a:r>
           </a:p>
           <a:p>
             <a:pPr lvl="4"/>
             <a:r>
-              <a:rPr lang="en-US" smtClean="0"/>
+              <a:rPr lang="en-US"/>
               <a:t>Fifth level</a:t>
             </a:r>
-            <a:endParaRPr lang="en-US"/>
           </a:p>
         </p:txBody>
       </p:sp>
@@ -1661,7 +1663,7 @@
           <a:p>
             <a:pPr lvl="0"/>
             <a:r>
-              <a:rPr lang="en-US" smtClean="0"/>
+              <a:rPr lang="en-US"/>
               <a:t>Click to edit Master text styles</a:t>
             </a:r>
           </a:p>
@@ -1717,38 +1719,37 @@
           <a:p>
             <a:pPr lvl="0"/>
             <a:r>
-              <a:rPr lang="en-US" smtClean="0"/>
+              <a:rPr lang="en-US"/>
               <a:t>Click to edit Master text styles</a:t>
             </a:r>
           </a:p>
           <a:p>
             <a:pPr lvl="1"/>
             <a:r>
-              <a:rPr lang="en-US" smtClean="0"/>
+              <a:rPr lang="en-US"/>
               <a:t>Second level</a:t>
             </a:r>
           </a:p>
           <a:p>
             <a:pPr lvl="2"/>
             <a:r>
-              <a:rPr lang="en-US" smtClean="0"/>
+              <a:rPr lang="en-US"/>
               <a:t>Third level</a:t>
             </a:r>
           </a:p>
           <a:p>
             <a:pPr lvl="3"/>
             <a:r>
-              <a:rPr lang="en-US" smtClean="0"/>
+              <a:rPr lang="en-US"/>
               <a:t>Fourth level</a:t>
             </a:r>
           </a:p>
           <a:p>
             <a:pPr lvl="4"/>
             <a:r>
-              <a:rPr lang="en-US" smtClean="0"/>
+              <a:rPr lang="en-US"/>
               <a:t>Fifth level</a:t>
             </a:r>
-            <a:endParaRPr lang="en-US"/>
           </a:p>
         </p:txBody>
       </p:sp>
@@ -1769,7 +1770,7 @@
           <a:p>
             <a:fld id="{5BCAD085-E8A6-8845-BD4E-CB4CCA059FC4}" type="datetimeFigureOut">
               <a:rPr lang="en-US" smtClean="0"/>
-              <a:t>1/27/13</a:t>
+              <a:t>12/16/25</a:t>
             </a:fld>
             <a:endParaRPr lang="en-US"/>
           </a:p>
@@ -1863,10 +1864,9 @@
           <a:lstStyle/>
           <a:p>
             <a:r>
-              <a:rPr lang="en-US" smtClean="0"/>
+              <a:rPr lang="en-US"/>
               <a:t>Click to edit Master title style</a:t>
             </a:r>
-            <a:endParaRPr lang="en-US"/>
           </a:p>
         </p:txBody>
       </p:sp>
@@ -1887,7 +1887,7 @@
           <a:p>
             <a:fld id="{5BCAD085-E8A6-8845-BD4E-CB4CCA059FC4}" type="datetimeFigureOut">
               <a:rPr lang="en-US" smtClean="0"/>
-              <a:t>1/27/13</a:t>
+              <a:t>12/16/25</a:t>
             </a:fld>
             <a:endParaRPr lang="en-US"/>
           </a:p>
@@ -1982,7 +1982,7 @@
           <a:p>
             <a:fld id="{5BCAD085-E8A6-8845-BD4E-CB4CCA059FC4}" type="datetimeFigureOut">
               <a:rPr lang="en-US" smtClean="0"/>
-              <a:t>1/27/13</a:t>
+              <a:t>12/16/25</a:t>
             </a:fld>
             <a:endParaRPr lang="en-US"/>
           </a:p>
@@ -2085,10 +2085,9 @@
           </a:lstStyle>
           <a:p>
             <a:r>
-              <a:rPr lang="en-US" smtClean="0"/>
+              <a:rPr lang="en-US"/>
               <a:t>Click to edit Master title style</a:t>
             </a:r>
-            <a:endParaRPr lang="en-US"/>
           </a:p>
         </p:txBody>
       </p:sp>
@@ -2142,38 +2141,37 @@
           <a:p>
             <a:pPr lvl="0"/>
             <a:r>
-              <a:rPr lang="en-US" smtClean="0"/>
+              <a:rPr lang="en-US"/>
               <a:t>Click to edit Master text styles</a:t>
             </a:r>
           </a:p>
           <a:p>
             <a:pPr lvl="1"/>
             <a:r>
-              <a:rPr lang="en-US" smtClean="0"/>
+              <a:rPr lang="en-US"/>
               <a:t>Second level</a:t>
             </a:r>
           </a:p>
           <a:p>
             <a:pPr lvl="2"/>
             <a:r>
-              <a:rPr lang="en-US" smtClean="0"/>
+              <a:rPr lang="en-US"/>
               <a:t>Third level</a:t>
             </a:r>
           </a:p>
           <a:p>
             <a:pPr lvl="3"/>
             <a:r>
-              <a:rPr lang="en-US" smtClean="0"/>
+              <a:rPr lang="en-US"/>
               <a:t>Fourth level</a:t>
             </a:r>
           </a:p>
           <a:p>
             <a:pPr lvl="4"/>
             <a:r>
-              <a:rPr lang="en-US" smtClean="0"/>
+              <a:rPr lang="en-US"/>
               <a:t>Fifth level</a:t>
             </a:r>
-            <a:endParaRPr lang="en-US"/>
           </a:p>
         </p:txBody>
       </p:sp>
@@ -2236,7 +2234,7 @@
           <a:p>
             <a:pPr lvl="0"/>
             <a:r>
-              <a:rPr lang="en-US" smtClean="0"/>
+              <a:rPr lang="en-US"/>
               <a:t>Click to edit Master text styles</a:t>
             </a:r>
           </a:p>
@@ -2259,7 +2257,7 @@
           <a:p>
             <a:fld id="{5BCAD085-E8A6-8845-BD4E-CB4CCA059FC4}" type="datetimeFigureOut">
               <a:rPr lang="en-US" smtClean="0"/>
-              <a:t>1/27/13</a:t>
+              <a:t>12/16/25</a:t>
             </a:fld>
             <a:endParaRPr lang="en-US"/>
           </a:p>
@@ -2362,10 +2360,9 @@
           </a:lstStyle>
           <a:p>
             <a:r>
-              <a:rPr lang="en-US" smtClean="0"/>
+              <a:rPr lang="en-US"/>
               <a:t>Click to edit Master title style</a:t>
             </a:r>
-            <a:endParaRPr lang="en-US"/>
           </a:p>
         </p:txBody>
       </p:sp>
@@ -2489,7 +2486,7 @@
           <a:p>
             <a:pPr lvl="0"/>
             <a:r>
-              <a:rPr lang="en-US" smtClean="0"/>
+              <a:rPr lang="en-US"/>
               <a:t>Click to edit Master text styles</a:t>
             </a:r>
           </a:p>
@@ -2512,7 +2509,7 @@
           <a:p>
             <a:fld id="{5BCAD085-E8A6-8845-BD4E-CB4CCA059FC4}" type="datetimeFigureOut">
               <a:rPr lang="en-US" smtClean="0"/>
-              <a:t>1/27/13</a:t>
+              <a:t>12/16/25</a:t>
             </a:fld>
             <a:endParaRPr lang="en-US"/>
           </a:p>
@@ -2621,10 +2618,9 @@
           <a:lstStyle/>
           <a:p>
             <a:r>
-              <a:rPr lang="en-US" smtClean="0"/>
+              <a:rPr lang="en-US"/>
               <a:t>Click to edit Master title style</a:t>
             </a:r>
-            <a:endParaRPr lang="en-US"/>
           </a:p>
         </p:txBody>
       </p:sp>
@@ -2655,38 +2651,37 @@
           <a:p>
             <a:pPr lvl="0"/>
             <a:r>
-              <a:rPr lang="en-US" smtClean="0"/>
+              <a:rPr lang="en-US"/>
               <a:t>Click to edit Master text styles</a:t>
             </a:r>
           </a:p>
           <a:p>
             <a:pPr lvl="1"/>
             <a:r>
-              <a:rPr lang="en-US" smtClean="0"/>
+              <a:rPr lang="en-US"/>
               <a:t>Second level</a:t>
             </a:r>
           </a:p>
           <a:p>
             <a:pPr lvl="2"/>
             <a:r>
-              <a:rPr lang="en-US" smtClean="0"/>
+              <a:rPr lang="en-US"/>
               <a:t>Third level</a:t>
             </a:r>
           </a:p>
           <a:p>
             <a:pPr lvl="3"/>
             <a:r>
-              <a:rPr lang="en-US" smtClean="0"/>
+              <a:rPr lang="en-US"/>
               <a:t>Fourth level</a:t>
             </a:r>
           </a:p>
           <a:p>
             <a:pPr lvl="4"/>
             <a:r>
-              <a:rPr lang="en-US" smtClean="0"/>
+              <a:rPr lang="en-US"/>
               <a:t>Fifth level</a:t>
             </a:r>
-            <a:endParaRPr lang="en-US"/>
           </a:p>
         </p:txBody>
       </p:sp>
@@ -2725,7 +2720,7 @@
           <a:p>
             <a:fld id="{5BCAD085-E8A6-8845-BD4E-CB4CCA059FC4}" type="datetimeFigureOut">
               <a:rPr lang="en-US" smtClean="0"/>
-              <a:t>1/27/13</a:t>
+              <a:t>12/16/25</a:t>
             </a:fld>
             <a:endParaRPr lang="en-US"/>
           </a:p>
@@ -3084,7 +3079,7 @@
 </file>
 
 <file path=ppt/slides/slide1.xml><?xml version="1.0" encoding="utf-8"?>
-<p:sld xmlns:a="http://schemas.openxmlformats.org/drawingml/2006/main" xmlns:p="http://schemas.openxmlformats.org/presentationml/2006/main" xmlns:r="http://schemas.openxmlformats.org/officeDocument/2006/relationships">
+<p:sld xmlns:a="http://schemas.openxmlformats.org/drawingml/2006/main" xmlns:r="http://schemas.openxmlformats.org/officeDocument/2006/relationships" xmlns:p="http://schemas.openxmlformats.org/presentationml/2006/main">
   <p:cSld>
     <p:bg>
       <p:bgPr>
@@ -3100,7 +3095,14 @@
         <p:cNvGrpSpPr/>
         <p:nvPr/>
       </p:nvGrpSpPr>
-      <p:grpSpPr/>
+      <p:grpSpPr>
+        <a:xfrm>
+          <a:off x="0" y="0"/>
+          <a:ext cx="0" cy="0"/>
+          <a:chOff x="0" y="0"/>
+          <a:chExt cx="0" cy="0"/>
+        </a:xfrm>
+      </p:grpSpPr>
       <p:sp>
         <p:nvSpPr>
           <p:cNvPr id="2" name="TextBox 1"/>
@@ -3206,52 +3208,6 @@
           </a:p>
         </p:txBody>
       </p:sp>
-      <p:sp>
-        <p:nvSpPr>
-          <p:cNvPr id="5" name="TextBox 4"/>
-          <p:cNvSpPr txBox="1"/>
-          <p:nvPr/>
-        </p:nvSpPr>
-        <p:spPr>
-          <a:xfrm>
-            <a:off x="914400" y="6858000"/>
-            <a:ext cx="12801600" cy="914400"/>
-          </a:xfrm>
-          <a:prstGeom prst="rect">
-            <a:avLst/>
-          </a:prstGeom>
-          <a:noFill/>
-        </p:spPr>
-        <p:txBody>
-          <a:bodyPr wrap="none">
-            <a:spAutoFit/>
-          </a:bodyPr>
-          <a:lstStyle/>
-          <a:p>
-            <a:pPr algn="ctr">
-              <a:defRPr sz="1600">
-                <a:solidFill>
-                  <a:srgbClr val="1F2937"/>
-                </a:solidFill>
-              </a:defRPr>
-            </a:pPr>
-            <a:r>
-              <a:t>Alikhan</a:t>
-            </a:r>
-          </a:p>
-          <a:p>
-            <a:r>
-              <a:t>INFO Semester Project • December 2025</a:t>
-            </a:r>
-          </a:p>
-          <a:p/>
-          <a:p>
-            <a:r>
-              <a:t>github.com/AlikhanIllini/Final_Project_Alikhan_alikhan4</a:t>
-            </a:r>
-          </a:p>
-        </p:txBody>
-      </p:sp>
     </p:spTree>
   </p:cSld>
   <p:clrMapOvr>
@@ -3261,7 +3217,7 @@
 </file>
 
 <file path=ppt/slides/slide2.xml><?xml version="1.0" encoding="utf-8"?>
-<p:sld xmlns:a="http://schemas.openxmlformats.org/drawingml/2006/main" xmlns:p="http://schemas.openxmlformats.org/presentationml/2006/main" xmlns:r="http://schemas.openxmlformats.org/officeDocument/2006/relationships">
+<p:sld xmlns:a="http://schemas.openxmlformats.org/drawingml/2006/main" xmlns:r="http://schemas.openxmlformats.org/officeDocument/2006/relationships" xmlns:p="http://schemas.openxmlformats.org/presentationml/2006/main">
   <p:cSld>
     <p:spTree>
       <p:nvGrpSpPr>
@@ -3269,7 +3225,14 @@
         <p:cNvGrpSpPr/>
         <p:nvPr/>
       </p:nvGrpSpPr>
-      <p:grpSpPr/>
+      <p:grpSpPr>
+        <a:xfrm>
+          <a:off x="0" y="0"/>
+          <a:ext cx="0" cy="0"/>
+          <a:chOff x="0" y="0"/>
+          <a:chExt cx="0" cy="0"/>
+        </a:xfrm>
+      </p:grpSpPr>
       <p:sp>
         <p:nvSpPr>
           <p:cNvPr id="2" name="TextBox 1"/>
@@ -3345,6 +3308,7 @@
           <a:lstStyle/>
           <a:p>
             <a:pPr algn="ctr"/>
+            <a:endParaRPr/>
           </a:p>
         </p:txBody>
       </p:sp>
@@ -3480,7 +3444,7 @@
 </file>
 
 <file path=ppt/slides/slide3.xml><?xml version="1.0" encoding="utf-8"?>
-<p:sld xmlns:a="http://schemas.openxmlformats.org/drawingml/2006/main" xmlns:p="http://schemas.openxmlformats.org/presentationml/2006/main" xmlns:r="http://schemas.openxmlformats.org/officeDocument/2006/relationships">
+<p:sld xmlns:a="http://schemas.openxmlformats.org/drawingml/2006/main" xmlns:r="http://schemas.openxmlformats.org/officeDocument/2006/relationships" xmlns:p="http://schemas.openxmlformats.org/presentationml/2006/main">
   <p:cSld>
     <p:spTree>
       <p:nvGrpSpPr>
@@ -3488,7 +3452,14 @@
         <p:cNvGrpSpPr/>
         <p:nvPr/>
       </p:nvGrpSpPr>
-      <p:grpSpPr/>
+      <p:grpSpPr>
+        <a:xfrm>
+          <a:off x="0" y="0"/>
+          <a:ext cx="0" cy="0"/>
+          <a:chOff x="0" y="0"/>
+          <a:chExt cx="0" cy="0"/>
+        </a:xfrm>
+      </p:grpSpPr>
       <p:sp>
         <p:nvSpPr>
           <p:cNvPr id="2" name="TextBox 1"/>
@@ -3716,7 +3687,7 @@
 </file>
 
 <file path=ppt/slides/slide4.xml><?xml version="1.0" encoding="utf-8"?>
-<p:sld xmlns:a="http://schemas.openxmlformats.org/drawingml/2006/main" xmlns:p="http://schemas.openxmlformats.org/presentationml/2006/main" xmlns:r="http://schemas.openxmlformats.org/officeDocument/2006/relationships">
+<p:sld xmlns:a="http://schemas.openxmlformats.org/drawingml/2006/main" xmlns:r="http://schemas.openxmlformats.org/officeDocument/2006/relationships" xmlns:p="http://schemas.openxmlformats.org/presentationml/2006/main">
   <p:cSld>
     <p:spTree>
       <p:nvGrpSpPr>
@@ -3724,7 +3695,14 @@
         <p:cNvGrpSpPr/>
         <p:nvPr/>
       </p:nvGrpSpPr>
-      <p:grpSpPr/>
+      <p:grpSpPr>
+        <a:xfrm>
+          <a:off x="0" y="0"/>
+          <a:ext cx="0" cy="0"/>
+          <a:chOff x="0" y="0"/>
+          <a:chExt cx="0" cy="0"/>
+        </a:xfrm>
+      </p:grpSpPr>
       <p:sp>
         <p:nvSpPr>
           <p:cNvPr id="2" name="TextBox 1"/>
@@ -4135,7 +4113,7 @@
 </file>
 
 <file path=ppt/slides/slide5.xml><?xml version="1.0" encoding="utf-8"?>
-<p:sld xmlns:a="http://schemas.openxmlformats.org/drawingml/2006/main" xmlns:p="http://schemas.openxmlformats.org/presentationml/2006/main" xmlns:r="http://schemas.openxmlformats.org/officeDocument/2006/relationships">
+<p:sld xmlns:a="http://schemas.openxmlformats.org/drawingml/2006/main" xmlns:r="http://schemas.openxmlformats.org/officeDocument/2006/relationships" xmlns:p="http://schemas.openxmlformats.org/presentationml/2006/main">
   <p:cSld>
     <p:spTree>
       <p:nvGrpSpPr>
@@ -4143,7 +4121,14 @@
         <p:cNvGrpSpPr/>
         <p:nvPr/>
       </p:nvGrpSpPr>
-      <p:grpSpPr/>
+      <p:grpSpPr>
+        <a:xfrm>
+          <a:off x="0" y="0"/>
+          <a:ext cx="0" cy="0"/>
+          <a:chOff x="0" y="0"/>
+          <a:chExt cx="0" cy="0"/>
+        </a:xfrm>
+      </p:grpSpPr>
       <p:sp>
         <p:nvSpPr>
           <p:cNvPr id="2" name="TextBox 1"/>
@@ -4463,7 +4448,7 @@
 </file>
 
 <file path=ppt/slides/slide6.xml><?xml version="1.0" encoding="utf-8"?>
-<p:sld xmlns:a="http://schemas.openxmlformats.org/drawingml/2006/main" xmlns:p="http://schemas.openxmlformats.org/presentationml/2006/main" xmlns:r="http://schemas.openxmlformats.org/officeDocument/2006/relationships">
+<p:sld xmlns:a="http://schemas.openxmlformats.org/drawingml/2006/main" xmlns:r="http://schemas.openxmlformats.org/officeDocument/2006/relationships" xmlns:p="http://schemas.openxmlformats.org/presentationml/2006/main">
   <p:cSld>
     <p:spTree>
       <p:nvGrpSpPr>
@@ -4471,7 +4456,14 @@
         <p:cNvGrpSpPr/>
         <p:nvPr/>
       </p:nvGrpSpPr>
-      <p:grpSpPr/>
+      <p:grpSpPr>
+        <a:xfrm>
+          <a:off x="0" y="0"/>
+          <a:ext cx="0" cy="0"/>
+          <a:chOff x="0" y="0"/>
+          <a:chExt cx="0" cy="0"/>
+        </a:xfrm>
+      </p:grpSpPr>
       <p:sp>
         <p:nvSpPr>
           <p:cNvPr id="2" name="TextBox 1"/>
@@ -4601,41 +4593,6 @@
             </a:pPr>
             <a:r>
               <a:t>5. Filters &amp; sorting</a:t>
-            </a:r>
-          </a:p>
-        </p:txBody>
-      </p:sp>
-      <p:sp>
-        <p:nvSpPr>
-          <p:cNvPr id="4" name="TextBox 3"/>
-          <p:cNvSpPr txBox="1"/>
-          <p:nvPr/>
-        </p:nvSpPr>
-        <p:spPr>
-          <a:xfrm>
-            <a:off x="1828800" y="6858000"/>
-            <a:ext cx="10972800" cy="731520"/>
-          </a:xfrm>
-          <a:prstGeom prst="rect">
-            <a:avLst/>
-          </a:prstGeom>
-          <a:noFill/>
-        </p:spPr>
-        <p:txBody>
-          <a:bodyPr wrap="none">
-            <a:spAutoFit/>
-          </a:bodyPr>
-          <a:lstStyle/>
-          <a:p>
-            <a:pPr algn="ctr">
-              <a:defRPr sz="1800" i="1">
-                <a:solidFill>
-                  <a:srgbClr val="EF4444"/>
-                </a:solidFill>
-              </a:defRPr>
-            </a:pPr>
-            <a:r>
-              <a:t>(Use this slide only if live demo fails - otherwise skip to live demo)</a:t>
             </a:r>
           </a:p>
         </p:txBody>

</xml_diff>

<commit_message>
Update admin credentials to mohitg2/graingerlibrary across all files and regenerate presentation
</commit_message>
<xml_diff>
--- a/Stock_Cards_Presentation.pptx
+++ b/Stock_Cards_Presentation.pptx
@@ -5,14 +5,14 @@
     <p:sldMasterId id="2147483648" r:id="rId1"/>
   </p:sldMasterIdLst>
   <p:sldIdLst>
-    <p:sldId id="256" r:id="rId2"/>
-    <p:sldId id="257" r:id="rId3"/>
-    <p:sldId id="258" r:id="rId4"/>
-    <p:sldId id="259" r:id="rId5"/>
-    <p:sldId id="260" r:id="rId6"/>
-    <p:sldId id="261" r:id="rId7"/>
+    <p:sldId id="256" r:id="rId7"/>
+    <p:sldId id="257" r:id="rId8"/>
+    <p:sldId id="258" r:id="rId9"/>
+    <p:sldId id="259" r:id="rId10"/>
+    <p:sldId id="260" r:id="rId11"/>
+    <p:sldId id="261" r:id="rId12"/>
   </p:sldIdLst>
-  <p:sldSz cx="14630400" cy="8229600"/>
+  <p:sldSz cx="14630400" cy="8229600" type="screen4x3"/>
   <p:notesSz cx="6858000" cy="9144000"/>
   <p:defaultTextStyle>
     <a:defPPr>
@@ -109,22 +109,6 @@
       </a:defRPr>
     </a:lvl9pPr>
   </p:defaultTextStyle>
-  <p:extLst>
-    <p:ext uri="{EFAFB233-063F-42B5-8137-9DF3F51BA10A}">
-      <p15:sldGuideLst xmlns:p15="http://schemas.microsoft.com/office/powerpoint/2012/main">
-        <p15:guide id="1" orient="horz" pos="2160">
-          <p15:clr>
-            <a:srgbClr val="A4A3A4"/>
-          </p15:clr>
-        </p15:guide>
-        <p15:guide id="2" pos="2880">
-          <p15:clr>
-            <a:srgbClr val="A4A3A4"/>
-          </p15:clr>
-        </p15:guide>
-      </p15:sldGuideLst>
-    </p:ext>
-  </p:extLst>
 </p:presentation>
 </file>
 
@@ -166,9 +150,10 @@
           <a:lstStyle/>
           <a:p>
             <a:r>
-              <a:rPr lang="en-US"/>
+              <a:rPr lang="en-US" smtClean="0"/>
               <a:t>Click to edit Master title style</a:t>
             </a:r>
+            <a:endParaRPr lang="en-US"/>
           </a:p>
         </p:txBody>
       </p:sp>
@@ -284,9 +269,10 @@
           </a:lstStyle>
           <a:p>
             <a:r>
-              <a:rPr lang="en-US"/>
+              <a:rPr lang="en-US" smtClean="0"/>
               <a:t>Click to edit Master subtitle style</a:t>
             </a:r>
+            <a:endParaRPr lang="en-US"/>
           </a:p>
         </p:txBody>
       </p:sp>
@@ -307,7 +293,7 @@
           <a:p>
             <a:fld id="{5BCAD085-E8A6-8845-BD4E-CB4CCA059FC4}" type="datetimeFigureOut">
               <a:rPr lang="en-US" smtClean="0"/>
-              <a:t>12/16/25</a:t>
+              <a:t>1/27/13</a:t>
             </a:fld>
             <a:endParaRPr lang="en-US"/>
           </a:p>
@@ -401,9 +387,10 @@
           <a:lstStyle/>
           <a:p>
             <a:r>
-              <a:rPr lang="en-US"/>
+              <a:rPr lang="en-US" smtClean="0"/>
               <a:t>Click to edit Master title style</a:t>
             </a:r>
+            <a:endParaRPr lang="en-US"/>
           </a:p>
         </p:txBody>
       </p:sp>
@@ -424,37 +411,38 @@
           <a:p>
             <a:pPr lvl="0"/>
             <a:r>
-              <a:rPr lang="en-US"/>
+              <a:rPr lang="en-US" smtClean="0"/>
               <a:t>Click to edit Master text styles</a:t>
             </a:r>
           </a:p>
           <a:p>
             <a:pPr lvl="1"/>
             <a:r>
-              <a:rPr lang="en-US"/>
+              <a:rPr lang="en-US" smtClean="0"/>
               <a:t>Second level</a:t>
             </a:r>
           </a:p>
           <a:p>
             <a:pPr lvl="2"/>
             <a:r>
-              <a:rPr lang="en-US"/>
+              <a:rPr lang="en-US" smtClean="0"/>
               <a:t>Third level</a:t>
             </a:r>
           </a:p>
           <a:p>
             <a:pPr lvl="3"/>
             <a:r>
-              <a:rPr lang="en-US"/>
+              <a:rPr lang="en-US" smtClean="0"/>
               <a:t>Fourth level</a:t>
             </a:r>
           </a:p>
           <a:p>
             <a:pPr lvl="4"/>
             <a:r>
-              <a:rPr lang="en-US"/>
+              <a:rPr lang="en-US" smtClean="0"/>
               <a:t>Fifth level</a:t>
             </a:r>
+            <a:endParaRPr lang="en-US"/>
           </a:p>
         </p:txBody>
       </p:sp>
@@ -475,7 +463,7 @@
           <a:p>
             <a:fld id="{5BCAD085-E8A6-8845-BD4E-CB4CCA059FC4}" type="datetimeFigureOut">
               <a:rPr lang="en-US" smtClean="0"/>
-              <a:t>12/16/25</a:t>
+              <a:t>1/27/13</a:t>
             </a:fld>
             <a:endParaRPr lang="en-US"/>
           </a:p>
@@ -574,9 +562,10 @@
           <a:lstStyle/>
           <a:p>
             <a:r>
-              <a:rPr lang="en-US"/>
+              <a:rPr lang="en-US" smtClean="0"/>
               <a:t>Click to edit Master title style</a:t>
             </a:r>
+            <a:endParaRPr lang="en-US"/>
           </a:p>
         </p:txBody>
       </p:sp>
@@ -602,37 +591,38 @@
           <a:p>
             <a:pPr lvl="0"/>
             <a:r>
-              <a:rPr lang="en-US"/>
+              <a:rPr lang="en-US" smtClean="0"/>
               <a:t>Click to edit Master text styles</a:t>
             </a:r>
           </a:p>
           <a:p>
             <a:pPr lvl="1"/>
             <a:r>
-              <a:rPr lang="en-US"/>
+              <a:rPr lang="en-US" smtClean="0"/>
               <a:t>Second level</a:t>
             </a:r>
           </a:p>
           <a:p>
             <a:pPr lvl="2"/>
             <a:r>
-              <a:rPr lang="en-US"/>
+              <a:rPr lang="en-US" smtClean="0"/>
               <a:t>Third level</a:t>
             </a:r>
           </a:p>
           <a:p>
             <a:pPr lvl="3"/>
             <a:r>
-              <a:rPr lang="en-US"/>
+              <a:rPr lang="en-US" smtClean="0"/>
               <a:t>Fourth level</a:t>
             </a:r>
           </a:p>
           <a:p>
             <a:pPr lvl="4"/>
             <a:r>
-              <a:rPr lang="en-US"/>
+              <a:rPr lang="en-US" smtClean="0"/>
               <a:t>Fifth level</a:t>
             </a:r>
+            <a:endParaRPr lang="en-US"/>
           </a:p>
         </p:txBody>
       </p:sp>
@@ -653,7 +643,7 @@
           <a:p>
             <a:fld id="{5BCAD085-E8A6-8845-BD4E-CB4CCA059FC4}" type="datetimeFigureOut">
               <a:rPr lang="en-US" smtClean="0"/>
-              <a:t>12/16/25</a:t>
+              <a:t>1/27/13</a:t>
             </a:fld>
             <a:endParaRPr lang="en-US"/>
           </a:p>
@@ -747,9 +737,10 @@
           <a:lstStyle/>
           <a:p>
             <a:r>
-              <a:rPr lang="en-US"/>
+              <a:rPr lang="en-US" smtClean="0"/>
               <a:t>Click to edit Master title style</a:t>
             </a:r>
+            <a:endParaRPr lang="en-US"/>
           </a:p>
         </p:txBody>
       </p:sp>
@@ -770,37 +761,38 @@
           <a:p>
             <a:pPr lvl="0"/>
             <a:r>
-              <a:rPr lang="en-US"/>
+              <a:rPr lang="en-US" smtClean="0"/>
               <a:t>Click to edit Master text styles</a:t>
             </a:r>
           </a:p>
           <a:p>
             <a:pPr lvl="1"/>
             <a:r>
-              <a:rPr lang="en-US"/>
+              <a:rPr lang="en-US" smtClean="0"/>
               <a:t>Second level</a:t>
             </a:r>
           </a:p>
           <a:p>
             <a:pPr lvl="2"/>
             <a:r>
-              <a:rPr lang="en-US"/>
+              <a:rPr lang="en-US" smtClean="0"/>
               <a:t>Third level</a:t>
             </a:r>
           </a:p>
           <a:p>
             <a:pPr lvl="3"/>
             <a:r>
-              <a:rPr lang="en-US"/>
+              <a:rPr lang="en-US" smtClean="0"/>
               <a:t>Fourth level</a:t>
             </a:r>
           </a:p>
           <a:p>
             <a:pPr lvl="4"/>
             <a:r>
-              <a:rPr lang="en-US"/>
+              <a:rPr lang="en-US" smtClean="0"/>
               <a:t>Fifth level</a:t>
             </a:r>
+            <a:endParaRPr lang="en-US"/>
           </a:p>
         </p:txBody>
       </p:sp>
@@ -821,7 +813,7 @@
           <a:p>
             <a:fld id="{5BCAD085-E8A6-8845-BD4E-CB4CCA059FC4}" type="datetimeFigureOut">
               <a:rPr lang="en-US" smtClean="0"/>
-              <a:t>12/16/25</a:t>
+              <a:t>1/27/13</a:t>
             </a:fld>
             <a:endParaRPr lang="en-US"/>
           </a:p>
@@ -924,9 +916,10 @@
           </a:lstStyle>
           <a:p>
             <a:r>
-              <a:rPr lang="en-US"/>
+              <a:rPr lang="en-US" smtClean="0"/>
               <a:t>Click to edit Master title style</a:t>
             </a:r>
+            <a:endParaRPr lang="en-US"/>
           </a:p>
         </p:txBody>
       </p:sp>
@@ -1043,7 +1036,7 @@
           <a:p>
             <a:pPr lvl="0"/>
             <a:r>
-              <a:rPr lang="en-US"/>
+              <a:rPr lang="en-US" smtClean="0"/>
               <a:t>Click to edit Master text styles</a:t>
             </a:r>
           </a:p>
@@ -1066,7 +1059,7 @@
           <a:p>
             <a:fld id="{5BCAD085-E8A6-8845-BD4E-CB4CCA059FC4}" type="datetimeFigureOut">
               <a:rPr lang="en-US" smtClean="0"/>
-              <a:t>12/16/25</a:t>
+              <a:t>1/27/13</a:t>
             </a:fld>
             <a:endParaRPr lang="en-US"/>
           </a:p>
@@ -1160,9 +1153,10 @@
           <a:lstStyle/>
           <a:p>
             <a:r>
-              <a:rPr lang="en-US"/>
+              <a:rPr lang="en-US" smtClean="0"/>
               <a:t>Click to edit Master title style</a:t>
             </a:r>
+            <a:endParaRPr lang="en-US"/>
           </a:p>
         </p:txBody>
       </p:sp>
@@ -1216,37 +1210,38 @@
           <a:p>
             <a:pPr lvl="0"/>
             <a:r>
-              <a:rPr lang="en-US"/>
+              <a:rPr lang="en-US" smtClean="0"/>
               <a:t>Click to edit Master text styles</a:t>
             </a:r>
           </a:p>
           <a:p>
             <a:pPr lvl="1"/>
             <a:r>
-              <a:rPr lang="en-US"/>
+              <a:rPr lang="en-US" smtClean="0"/>
               <a:t>Second level</a:t>
             </a:r>
           </a:p>
           <a:p>
             <a:pPr lvl="2"/>
             <a:r>
-              <a:rPr lang="en-US"/>
+              <a:rPr lang="en-US" smtClean="0"/>
               <a:t>Third level</a:t>
             </a:r>
           </a:p>
           <a:p>
             <a:pPr lvl="3"/>
             <a:r>
-              <a:rPr lang="en-US"/>
+              <a:rPr lang="en-US" smtClean="0"/>
               <a:t>Fourth level</a:t>
             </a:r>
           </a:p>
           <a:p>
             <a:pPr lvl="4"/>
             <a:r>
-              <a:rPr lang="en-US"/>
+              <a:rPr lang="en-US" smtClean="0"/>
               <a:t>Fifth level</a:t>
             </a:r>
+            <a:endParaRPr lang="en-US"/>
           </a:p>
         </p:txBody>
       </p:sp>
@@ -1300,37 +1295,38 @@
           <a:p>
             <a:pPr lvl="0"/>
             <a:r>
-              <a:rPr lang="en-US"/>
+              <a:rPr lang="en-US" smtClean="0"/>
               <a:t>Click to edit Master text styles</a:t>
             </a:r>
           </a:p>
           <a:p>
             <a:pPr lvl="1"/>
             <a:r>
-              <a:rPr lang="en-US"/>
+              <a:rPr lang="en-US" smtClean="0"/>
               <a:t>Second level</a:t>
             </a:r>
           </a:p>
           <a:p>
             <a:pPr lvl="2"/>
             <a:r>
-              <a:rPr lang="en-US"/>
+              <a:rPr lang="en-US" smtClean="0"/>
               <a:t>Third level</a:t>
             </a:r>
           </a:p>
           <a:p>
             <a:pPr lvl="3"/>
             <a:r>
-              <a:rPr lang="en-US"/>
+              <a:rPr lang="en-US" smtClean="0"/>
               <a:t>Fourth level</a:t>
             </a:r>
           </a:p>
           <a:p>
             <a:pPr lvl="4"/>
             <a:r>
-              <a:rPr lang="en-US"/>
+              <a:rPr lang="en-US" smtClean="0"/>
               <a:t>Fifth level</a:t>
             </a:r>
+            <a:endParaRPr lang="en-US"/>
           </a:p>
         </p:txBody>
       </p:sp>
@@ -1351,7 +1347,7 @@
           <a:p>
             <a:fld id="{5BCAD085-E8A6-8845-BD4E-CB4CCA059FC4}" type="datetimeFigureOut">
               <a:rPr lang="en-US" smtClean="0"/>
-              <a:t>12/16/25</a:t>
+              <a:t>1/27/13</a:t>
             </a:fld>
             <a:endParaRPr lang="en-US"/>
           </a:p>
@@ -1449,9 +1445,10 @@
           </a:lstStyle>
           <a:p>
             <a:r>
-              <a:rPr lang="en-US"/>
+              <a:rPr lang="en-US" smtClean="0"/>
               <a:t>Click to edit Master title style</a:t>
             </a:r>
+            <a:endParaRPr lang="en-US"/>
           </a:p>
         </p:txBody>
       </p:sp>
@@ -1514,7 +1511,7 @@
           <a:p>
             <a:pPr lvl="0"/>
             <a:r>
-              <a:rPr lang="en-US"/>
+              <a:rPr lang="en-US" smtClean="0"/>
               <a:t>Click to edit Master text styles</a:t>
             </a:r>
           </a:p>
@@ -1570,37 +1567,38 @@
           <a:p>
             <a:pPr lvl="0"/>
             <a:r>
-              <a:rPr lang="en-US"/>
+              <a:rPr lang="en-US" smtClean="0"/>
               <a:t>Click to edit Master text styles</a:t>
             </a:r>
           </a:p>
           <a:p>
             <a:pPr lvl="1"/>
             <a:r>
-              <a:rPr lang="en-US"/>
+              <a:rPr lang="en-US" smtClean="0"/>
               <a:t>Second level</a:t>
             </a:r>
           </a:p>
           <a:p>
             <a:pPr lvl="2"/>
             <a:r>
-              <a:rPr lang="en-US"/>
+              <a:rPr lang="en-US" smtClean="0"/>
               <a:t>Third level</a:t>
             </a:r>
           </a:p>
           <a:p>
             <a:pPr lvl="3"/>
             <a:r>
-              <a:rPr lang="en-US"/>
+              <a:rPr lang="en-US" smtClean="0"/>
               <a:t>Fourth level</a:t>
             </a:r>
           </a:p>
           <a:p>
             <a:pPr lvl="4"/>
             <a:r>
-              <a:rPr lang="en-US"/>
+              <a:rPr lang="en-US" smtClean="0"/>
               <a:t>Fifth level</a:t>
             </a:r>
+            <a:endParaRPr lang="en-US"/>
           </a:p>
         </p:txBody>
       </p:sp>
@@ -1663,7 +1661,7 @@
           <a:p>
             <a:pPr lvl="0"/>
             <a:r>
-              <a:rPr lang="en-US"/>
+              <a:rPr lang="en-US" smtClean="0"/>
               <a:t>Click to edit Master text styles</a:t>
             </a:r>
           </a:p>
@@ -1719,37 +1717,38 @@
           <a:p>
             <a:pPr lvl="0"/>
             <a:r>
-              <a:rPr lang="en-US"/>
+              <a:rPr lang="en-US" smtClean="0"/>
               <a:t>Click to edit Master text styles</a:t>
             </a:r>
           </a:p>
           <a:p>
             <a:pPr lvl="1"/>
             <a:r>
-              <a:rPr lang="en-US"/>
+              <a:rPr lang="en-US" smtClean="0"/>
               <a:t>Second level</a:t>
             </a:r>
           </a:p>
           <a:p>
             <a:pPr lvl="2"/>
             <a:r>
-              <a:rPr lang="en-US"/>
+              <a:rPr lang="en-US" smtClean="0"/>
               <a:t>Third level</a:t>
             </a:r>
           </a:p>
           <a:p>
             <a:pPr lvl="3"/>
             <a:r>
-              <a:rPr lang="en-US"/>
+              <a:rPr lang="en-US" smtClean="0"/>
               <a:t>Fourth level</a:t>
             </a:r>
           </a:p>
           <a:p>
             <a:pPr lvl="4"/>
             <a:r>
-              <a:rPr lang="en-US"/>
+              <a:rPr lang="en-US" smtClean="0"/>
               <a:t>Fifth level</a:t>
             </a:r>
+            <a:endParaRPr lang="en-US"/>
           </a:p>
         </p:txBody>
       </p:sp>
@@ -1770,7 +1769,7 @@
           <a:p>
             <a:fld id="{5BCAD085-E8A6-8845-BD4E-CB4CCA059FC4}" type="datetimeFigureOut">
               <a:rPr lang="en-US" smtClean="0"/>
-              <a:t>12/16/25</a:t>
+              <a:t>1/27/13</a:t>
             </a:fld>
             <a:endParaRPr lang="en-US"/>
           </a:p>
@@ -1864,9 +1863,10 @@
           <a:lstStyle/>
           <a:p>
             <a:r>
-              <a:rPr lang="en-US"/>
+              <a:rPr lang="en-US" smtClean="0"/>
               <a:t>Click to edit Master title style</a:t>
             </a:r>
+            <a:endParaRPr lang="en-US"/>
           </a:p>
         </p:txBody>
       </p:sp>
@@ -1887,7 +1887,7 @@
           <a:p>
             <a:fld id="{5BCAD085-E8A6-8845-BD4E-CB4CCA059FC4}" type="datetimeFigureOut">
               <a:rPr lang="en-US" smtClean="0"/>
-              <a:t>12/16/25</a:t>
+              <a:t>1/27/13</a:t>
             </a:fld>
             <a:endParaRPr lang="en-US"/>
           </a:p>
@@ -1982,7 +1982,7 @@
           <a:p>
             <a:fld id="{5BCAD085-E8A6-8845-BD4E-CB4CCA059FC4}" type="datetimeFigureOut">
               <a:rPr lang="en-US" smtClean="0"/>
-              <a:t>12/16/25</a:t>
+              <a:t>1/27/13</a:t>
             </a:fld>
             <a:endParaRPr lang="en-US"/>
           </a:p>
@@ -2085,9 +2085,10 @@
           </a:lstStyle>
           <a:p>
             <a:r>
-              <a:rPr lang="en-US"/>
+              <a:rPr lang="en-US" smtClean="0"/>
               <a:t>Click to edit Master title style</a:t>
             </a:r>
+            <a:endParaRPr lang="en-US"/>
           </a:p>
         </p:txBody>
       </p:sp>
@@ -2141,37 +2142,38 @@
           <a:p>
             <a:pPr lvl="0"/>
             <a:r>
-              <a:rPr lang="en-US"/>
+              <a:rPr lang="en-US" smtClean="0"/>
               <a:t>Click to edit Master text styles</a:t>
             </a:r>
           </a:p>
           <a:p>
             <a:pPr lvl="1"/>
             <a:r>
-              <a:rPr lang="en-US"/>
+              <a:rPr lang="en-US" smtClean="0"/>
               <a:t>Second level</a:t>
             </a:r>
           </a:p>
           <a:p>
             <a:pPr lvl="2"/>
             <a:r>
-              <a:rPr lang="en-US"/>
+              <a:rPr lang="en-US" smtClean="0"/>
               <a:t>Third level</a:t>
             </a:r>
           </a:p>
           <a:p>
             <a:pPr lvl="3"/>
             <a:r>
-              <a:rPr lang="en-US"/>
+              <a:rPr lang="en-US" smtClean="0"/>
               <a:t>Fourth level</a:t>
             </a:r>
           </a:p>
           <a:p>
             <a:pPr lvl="4"/>
             <a:r>
-              <a:rPr lang="en-US"/>
+              <a:rPr lang="en-US" smtClean="0"/>
               <a:t>Fifth level</a:t>
             </a:r>
+            <a:endParaRPr lang="en-US"/>
           </a:p>
         </p:txBody>
       </p:sp>
@@ -2234,7 +2236,7 @@
           <a:p>
             <a:pPr lvl="0"/>
             <a:r>
-              <a:rPr lang="en-US"/>
+              <a:rPr lang="en-US" smtClean="0"/>
               <a:t>Click to edit Master text styles</a:t>
             </a:r>
           </a:p>
@@ -2257,7 +2259,7 @@
           <a:p>
             <a:fld id="{5BCAD085-E8A6-8845-BD4E-CB4CCA059FC4}" type="datetimeFigureOut">
               <a:rPr lang="en-US" smtClean="0"/>
-              <a:t>12/16/25</a:t>
+              <a:t>1/27/13</a:t>
             </a:fld>
             <a:endParaRPr lang="en-US"/>
           </a:p>
@@ -2360,9 +2362,10 @@
           </a:lstStyle>
           <a:p>
             <a:r>
-              <a:rPr lang="en-US"/>
+              <a:rPr lang="en-US" smtClean="0"/>
               <a:t>Click to edit Master title style</a:t>
             </a:r>
+            <a:endParaRPr lang="en-US"/>
           </a:p>
         </p:txBody>
       </p:sp>
@@ -2486,7 +2489,7 @@
           <a:p>
             <a:pPr lvl="0"/>
             <a:r>
-              <a:rPr lang="en-US"/>
+              <a:rPr lang="en-US" smtClean="0"/>
               <a:t>Click to edit Master text styles</a:t>
             </a:r>
           </a:p>
@@ -2509,7 +2512,7 @@
           <a:p>
             <a:fld id="{5BCAD085-E8A6-8845-BD4E-CB4CCA059FC4}" type="datetimeFigureOut">
               <a:rPr lang="en-US" smtClean="0"/>
-              <a:t>12/16/25</a:t>
+              <a:t>1/27/13</a:t>
             </a:fld>
             <a:endParaRPr lang="en-US"/>
           </a:p>
@@ -2618,9 +2621,10 @@
           <a:lstStyle/>
           <a:p>
             <a:r>
-              <a:rPr lang="en-US"/>
+              <a:rPr lang="en-US" smtClean="0"/>
               <a:t>Click to edit Master title style</a:t>
             </a:r>
+            <a:endParaRPr lang="en-US"/>
           </a:p>
         </p:txBody>
       </p:sp>
@@ -2651,37 +2655,38 @@
           <a:p>
             <a:pPr lvl="0"/>
             <a:r>
-              <a:rPr lang="en-US"/>
+              <a:rPr lang="en-US" smtClean="0"/>
               <a:t>Click to edit Master text styles</a:t>
             </a:r>
           </a:p>
           <a:p>
             <a:pPr lvl="1"/>
             <a:r>
-              <a:rPr lang="en-US"/>
+              <a:rPr lang="en-US" smtClean="0"/>
               <a:t>Second level</a:t>
             </a:r>
           </a:p>
           <a:p>
             <a:pPr lvl="2"/>
             <a:r>
-              <a:rPr lang="en-US"/>
+              <a:rPr lang="en-US" smtClean="0"/>
               <a:t>Third level</a:t>
             </a:r>
           </a:p>
           <a:p>
             <a:pPr lvl="3"/>
             <a:r>
-              <a:rPr lang="en-US"/>
+              <a:rPr lang="en-US" smtClean="0"/>
               <a:t>Fourth level</a:t>
             </a:r>
           </a:p>
           <a:p>
             <a:pPr lvl="4"/>
             <a:r>
-              <a:rPr lang="en-US"/>
+              <a:rPr lang="en-US" smtClean="0"/>
               <a:t>Fifth level</a:t>
             </a:r>
+            <a:endParaRPr lang="en-US"/>
           </a:p>
         </p:txBody>
       </p:sp>
@@ -2720,7 +2725,7 @@
           <a:p>
             <a:fld id="{5BCAD085-E8A6-8845-BD4E-CB4CCA059FC4}" type="datetimeFigureOut">
               <a:rPr lang="en-US" smtClean="0"/>
-              <a:t>12/16/25</a:t>
+              <a:t>1/27/13</a:t>
             </a:fld>
             <a:endParaRPr lang="en-US"/>
           </a:p>
@@ -3079,7 +3084,7 @@
 </file>
 
 <file path=ppt/slides/slide1.xml><?xml version="1.0" encoding="utf-8"?>
-<p:sld xmlns:a="http://schemas.openxmlformats.org/drawingml/2006/main" xmlns:r="http://schemas.openxmlformats.org/officeDocument/2006/relationships" xmlns:p="http://schemas.openxmlformats.org/presentationml/2006/main">
+<p:sld xmlns:a="http://schemas.openxmlformats.org/drawingml/2006/main" xmlns:p="http://schemas.openxmlformats.org/presentationml/2006/main" xmlns:r="http://schemas.openxmlformats.org/officeDocument/2006/relationships">
   <p:cSld>
     <p:bg>
       <p:bgPr>
@@ -3095,14 +3100,7 @@
         <p:cNvGrpSpPr/>
         <p:nvPr/>
       </p:nvGrpSpPr>
-      <p:grpSpPr>
-        <a:xfrm>
-          <a:off x="0" y="0"/>
-          <a:ext cx="0" cy="0"/>
-          <a:chOff x="0" y="0"/>
-          <a:chExt cx="0" cy="0"/>
-        </a:xfrm>
-      </p:grpSpPr>
+      <p:grpSpPr/>
       <p:sp>
         <p:nvSpPr>
           <p:cNvPr id="2" name="TextBox 1"/>
@@ -3208,6 +3206,57 @@
           </a:p>
         </p:txBody>
       </p:sp>
+      <p:sp>
+        <p:nvSpPr>
+          <p:cNvPr id="5" name="TextBox 4"/>
+          <p:cNvSpPr txBox="1"/>
+          <p:nvPr/>
+        </p:nvSpPr>
+        <p:spPr>
+          <a:xfrm>
+            <a:off x="914400" y="6858000"/>
+            <a:ext cx="12801600" cy="914400"/>
+          </a:xfrm>
+          <a:prstGeom prst="rect">
+            <a:avLst/>
+          </a:prstGeom>
+          <a:noFill/>
+        </p:spPr>
+        <p:txBody>
+          <a:bodyPr wrap="none">
+            <a:spAutoFit/>
+          </a:bodyPr>
+          <a:lstStyle/>
+          <a:p>
+            <a:pPr algn="ctr">
+              <a:defRPr sz="1400">
+                <a:solidFill>
+                  <a:srgbClr val="1F2937"/>
+                </a:solidFill>
+              </a:defRPr>
+            </a:pPr>
+            <a:r>
+              <a:t>Alikhan</a:t>
+            </a:r>
+          </a:p>
+          <a:p>
+            <a:r>
+              <a:t>INFO Semester Project • December 2025</a:t>
+            </a:r>
+          </a:p>
+          <a:p/>
+          <a:p>
+            <a:r>
+              <a:t>Admin: mohitg2 / graingerlibrary</a:t>
+            </a:r>
+          </a:p>
+          <a:p>
+            <a:r>
+              <a:t>github.com/AlikhanIllini/Final_Project_Alikhan_alikhan4</a:t>
+            </a:r>
+          </a:p>
+        </p:txBody>
+      </p:sp>
     </p:spTree>
   </p:cSld>
   <p:clrMapOvr>
@@ -3217,7 +3266,7 @@
 </file>
 
 <file path=ppt/slides/slide2.xml><?xml version="1.0" encoding="utf-8"?>
-<p:sld xmlns:a="http://schemas.openxmlformats.org/drawingml/2006/main" xmlns:r="http://schemas.openxmlformats.org/officeDocument/2006/relationships" xmlns:p="http://schemas.openxmlformats.org/presentationml/2006/main">
+<p:sld xmlns:a="http://schemas.openxmlformats.org/drawingml/2006/main" xmlns:p="http://schemas.openxmlformats.org/presentationml/2006/main" xmlns:r="http://schemas.openxmlformats.org/officeDocument/2006/relationships">
   <p:cSld>
     <p:spTree>
       <p:nvGrpSpPr>
@@ -3225,14 +3274,7 @@
         <p:cNvGrpSpPr/>
         <p:nvPr/>
       </p:nvGrpSpPr>
-      <p:grpSpPr>
-        <a:xfrm>
-          <a:off x="0" y="0"/>
-          <a:ext cx="0" cy="0"/>
-          <a:chOff x="0" y="0"/>
-          <a:chExt cx="0" cy="0"/>
-        </a:xfrm>
-      </p:grpSpPr>
+      <p:grpSpPr/>
       <p:sp>
         <p:nvSpPr>
           <p:cNvPr id="2" name="TextBox 1"/>
@@ -3308,7 +3350,6 @@
           <a:lstStyle/>
           <a:p>
             <a:pPr algn="ctr"/>
-            <a:endParaRPr/>
           </a:p>
         </p:txBody>
       </p:sp>
@@ -3444,7 +3485,7 @@
 </file>
 
 <file path=ppt/slides/slide3.xml><?xml version="1.0" encoding="utf-8"?>
-<p:sld xmlns:a="http://schemas.openxmlformats.org/drawingml/2006/main" xmlns:r="http://schemas.openxmlformats.org/officeDocument/2006/relationships" xmlns:p="http://schemas.openxmlformats.org/presentationml/2006/main">
+<p:sld xmlns:a="http://schemas.openxmlformats.org/drawingml/2006/main" xmlns:p="http://schemas.openxmlformats.org/presentationml/2006/main" xmlns:r="http://schemas.openxmlformats.org/officeDocument/2006/relationships">
   <p:cSld>
     <p:spTree>
       <p:nvGrpSpPr>
@@ -3452,14 +3493,7 @@
         <p:cNvGrpSpPr/>
         <p:nvPr/>
       </p:nvGrpSpPr>
-      <p:grpSpPr>
-        <a:xfrm>
-          <a:off x="0" y="0"/>
-          <a:ext cx="0" cy="0"/>
-          <a:chOff x="0" y="0"/>
-          <a:chExt cx="0" cy="0"/>
-        </a:xfrm>
-      </p:grpSpPr>
+      <p:grpSpPr/>
       <p:sp>
         <p:nvSpPr>
           <p:cNvPr id="2" name="TextBox 1"/>
@@ -3687,7 +3721,7 @@
 </file>
 
 <file path=ppt/slides/slide4.xml><?xml version="1.0" encoding="utf-8"?>
-<p:sld xmlns:a="http://schemas.openxmlformats.org/drawingml/2006/main" xmlns:r="http://schemas.openxmlformats.org/officeDocument/2006/relationships" xmlns:p="http://schemas.openxmlformats.org/presentationml/2006/main">
+<p:sld xmlns:a="http://schemas.openxmlformats.org/drawingml/2006/main" xmlns:p="http://schemas.openxmlformats.org/presentationml/2006/main" xmlns:r="http://schemas.openxmlformats.org/officeDocument/2006/relationships">
   <p:cSld>
     <p:spTree>
       <p:nvGrpSpPr>
@@ -3695,14 +3729,7 @@
         <p:cNvGrpSpPr/>
         <p:nvPr/>
       </p:nvGrpSpPr>
-      <p:grpSpPr>
-        <a:xfrm>
-          <a:off x="0" y="0"/>
-          <a:ext cx="0" cy="0"/>
-          <a:chOff x="0" y="0"/>
-          <a:chExt cx="0" cy="0"/>
-        </a:xfrm>
-      </p:grpSpPr>
+      <p:grpSpPr/>
       <p:sp>
         <p:nvSpPr>
           <p:cNvPr id="2" name="TextBox 1"/>
@@ -4113,7 +4140,7 @@
 </file>
 
 <file path=ppt/slides/slide5.xml><?xml version="1.0" encoding="utf-8"?>
-<p:sld xmlns:a="http://schemas.openxmlformats.org/drawingml/2006/main" xmlns:r="http://schemas.openxmlformats.org/officeDocument/2006/relationships" xmlns:p="http://schemas.openxmlformats.org/presentationml/2006/main">
+<p:sld xmlns:a="http://schemas.openxmlformats.org/drawingml/2006/main" xmlns:p="http://schemas.openxmlformats.org/presentationml/2006/main" xmlns:r="http://schemas.openxmlformats.org/officeDocument/2006/relationships">
   <p:cSld>
     <p:spTree>
       <p:nvGrpSpPr>
@@ -4121,14 +4148,7 @@
         <p:cNvGrpSpPr/>
         <p:nvPr/>
       </p:nvGrpSpPr>
-      <p:grpSpPr>
-        <a:xfrm>
-          <a:off x="0" y="0"/>
-          <a:ext cx="0" cy="0"/>
-          <a:chOff x="0" y="0"/>
-          <a:chExt cx="0" cy="0"/>
-        </a:xfrm>
-      </p:grpSpPr>
+      <p:grpSpPr/>
       <p:sp>
         <p:nvSpPr>
           <p:cNvPr id="2" name="TextBox 1"/>
@@ -4448,7 +4468,7 @@
 </file>
 
 <file path=ppt/slides/slide6.xml><?xml version="1.0" encoding="utf-8"?>
-<p:sld xmlns:a="http://schemas.openxmlformats.org/drawingml/2006/main" xmlns:r="http://schemas.openxmlformats.org/officeDocument/2006/relationships" xmlns:p="http://schemas.openxmlformats.org/presentationml/2006/main">
+<p:sld xmlns:a="http://schemas.openxmlformats.org/drawingml/2006/main" xmlns:p="http://schemas.openxmlformats.org/presentationml/2006/main" xmlns:r="http://schemas.openxmlformats.org/officeDocument/2006/relationships">
   <p:cSld>
     <p:spTree>
       <p:nvGrpSpPr>
@@ -4456,14 +4476,7 @@
         <p:cNvGrpSpPr/>
         <p:nvPr/>
       </p:nvGrpSpPr>
-      <p:grpSpPr>
-        <a:xfrm>
-          <a:off x="0" y="0"/>
-          <a:ext cx="0" cy="0"/>
-          <a:chOff x="0" y="0"/>
-          <a:chExt cx="0" cy="0"/>
-        </a:xfrm>
-      </p:grpSpPr>
+      <p:grpSpPr/>
       <p:sp>
         <p:nvSpPr>
           <p:cNvPr id="2" name="TextBox 1"/>
@@ -4593,6 +4606,41 @@
             </a:pPr>
             <a:r>
               <a:t>5. Filters &amp; sorting</a:t>
+            </a:r>
+          </a:p>
+        </p:txBody>
+      </p:sp>
+      <p:sp>
+        <p:nvSpPr>
+          <p:cNvPr id="4" name="TextBox 3"/>
+          <p:cNvSpPr txBox="1"/>
+          <p:nvPr/>
+        </p:nvSpPr>
+        <p:spPr>
+          <a:xfrm>
+            <a:off x="1828800" y="6858000"/>
+            <a:ext cx="10972800" cy="731520"/>
+          </a:xfrm>
+          <a:prstGeom prst="rect">
+            <a:avLst/>
+          </a:prstGeom>
+          <a:noFill/>
+        </p:spPr>
+        <p:txBody>
+          <a:bodyPr wrap="none">
+            <a:spAutoFit/>
+          </a:bodyPr>
+          <a:lstStyle/>
+          <a:p>
+            <a:pPr algn="ctr">
+              <a:defRPr sz="1800" i="1">
+                <a:solidFill>
+                  <a:srgbClr val="EF4444"/>
+                </a:solidFill>
+              </a:defRPr>
+            </a:pPr>
+            <a:r>
+              <a:t>(Use this slide only if live demo fails - otherwise skip to live demo)</a:t>
             </a:r>
           </a:p>
         </p:txBody>

</xml_diff>